<commit_message>
Flip order of grabbing files and showing device information
</commit_message>
<xml_diff>
--- a/Drifter Follower.pptx
+++ b/Drifter Follower.pptx
@@ -11,6 +11,8 @@
     <p:sldId id="257" r:id="rId5"/>
     <p:sldId id="258" r:id="rId6"/>
     <p:sldId id="261" r:id="rId7"/>
+    <p:sldId id="263" r:id="rId8"/>
+    <p:sldId id="264" r:id="rId9"/>
   </p:sldIdLst>
   <p:sldSz cx="12192000" cy="6858000"/>
   <p:notesSz cx="6858000" cy="9144000"/>
@@ -266,7 +268,7 @@
           <a:p>
             <a:fld id="{0A51A183-A966-6D4F-A5BD-79CBF7AB6B18}" type="datetimeFigureOut">
               <a:rPr lang="es-US" smtClean="0"/>
-              <a:t>8/5/20</a:t>
+              <a:t>8/6/20</a:t>
             </a:fld>
             <a:endParaRPr lang="es-US"/>
           </a:p>
@@ -466,7 +468,7 @@
           <a:p>
             <a:fld id="{0A51A183-A966-6D4F-A5BD-79CBF7AB6B18}" type="datetimeFigureOut">
               <a:rPr lang="es-US" smtClean="0"/>
-              <a:t>8/5/20</a:t>
+              <a:t>8/6/20</a:t>
             </a:fld>
             <a:endParaRPr lang="es-US"/>
           </a:p>
@@ -676,7 +678,7 @@
           <a:p>
             <a:fld id="{0A51A183-A966-6D4F-A5BD-79CBF7AB6B18}" type="datetimeFigureOut">
               <a:rPr lang="es-US" smtClean="0"/>
-              <a:t>8/5/20</a:t>
+              <a:t>8/6/20</a:t>
             </a:fld>
             <a:endParaRPr lang="es-US"/>
           </a:p>
@@ -876,7 +878,7 @@
           <a:p>
             <a:fld id="{0A51A183-A966-6D4F-A5BD-79CBF7AB6B18}" type="datetimeFigureOut">
               <a:rPr lang="es-US" smtClean="0"/>
-              <a:t>8/5/20</a:t>
+              <a:t>8/6/20</a:t>
             </a:fld>
             <a:endParaRPr lang="es-US"/>
           </a:p>
@@ -1152,7 +1154,7 @@
           <a:p>
             <a:fld id="{0A51A183-A966-6D4F-A5BD-79CBF7AB6B18}" type="datetimeFigureOut">
               <a:rPr lang="es-US" smtClean="0"/>
-              <a:t>8/5/20</a:t>
+              <a:t>8/6/20</a:t>
             </a:fld>
             <a:endParaRPr lang="es-US"/>
           </a:p>
@@ -1420,7 +1422,7 @@
           <a:p>
             <a:fld id="{0A51A183-A966-6D4F-A5BD-79CBF7AB6B18}" type="datetimeFigureOut">
               <a:rPr lang="es-US" smtClean="0"/>
-              <a:t>8/5/20</a:t>
+              <a:t>8/6/20</a:t>
             </a:fld>
             <a:endParaRPr lang="es-US"/>
           </a:p>
@@ -1835,7 +1837,7 @@
           <a:p>
             <a:fld id="{0A51A183-A966-6D4F-A5BD-79CBF7AB6B18}" type="datetimeFigureOut">
               <a:rPr lang="es-US" smtClean="0"/>
-              <a:t>8/5/20</a:t>
+              <a:t>8/6/20</a:t>
             </a:fld>
             <a:endParaRPr lang="es-US"/>
           </a:p>
@@ -1977,7 +1979,7 @@
           <a:p>
             <a:fld id="{0A51A183-A966-6D4F-A5BD-79CBF7AB6B18}" type="datetimeFigureOut">
               <a:rPr lang="es-US" smtClean="0"/>
-              <a:t>8/5/20</a:t>
+              <a:t>8/6/20</a:t>
             </a:fld>
             <a:endParaRPr lang="es-US"/>
           </a:p>
@@ -2090,7 +2092,7 @@
           <a:p>
             <a:fld id="{0A51A183-A966-6D4F-A5BD-79CBF7AB6B18}" type="datetimeFigureOut">
               <a:rPr lang="es-US" smtClean="0"/>
-              <a:t>8/5/20</a:t>
+              <a:t>8/6/20</a:t>
             </a:fld>
             <a:endParaRPr lang="es-US"/>
           </a:p>
@@ -2403,7 +2405,7 @@
           <a:p>
             <a:fld id="{0A51A183-A966-6D4F-A5BD-79CBF7AB6B18}" type="datetimeFigureOut">
               <a:rPr lang="es-US" smtClean="0"/>
-              <a:t>8/5/20</a:t>
+              <a:t>8/6/20</a:t>
             </a:fld>
             <a:endParaRPr lang="es-US"/>
           </a:p>
@@ -2692,7 +2694,7 @@
           <a:p>
             <a:fld id="{0A51A183-A966-6D4F-A5BD-79CBF7AB6B18}" type="datetimeFigureOut">
               <a:rPr lang="es-US" smtClean="0"/>
-              <a:t>8/5/20</a:t>
+              <a:t>8/6/20</a:t>
             </a:fld>
             <a:endParaRPr lang="es-US"/>
           </a:p>
@@ -2935,7 +2937,7 @@
           <a:p>
             <a:fld id="{0A51A183-A966-6D4F-A5BD-79CBF7AB6B18}" type="datetimeFigureOut">
               <a:rPr lang="es-US" smtClean="0"/>
-              <a:t>8/5/20</a:t>
+              <a:t>8/6/20</a:t>
             </a:fld>
             <a:endParaRPr lang="es-US"/>
           </a:p>
@@ -5655,6 +5657,384 @@
 </p:sld>
 </file>
 
+<file path=ppt/slides/slide7.xml><?xml version="1.0" encoding="utf-8"?>
+<p:sld xmlns:a="http://schemas.openxmlformats.org/drawingml/2006/main" xmlns:r="http://schemas.openxmlformats.org/officeDocument/2006/relationships" xmlns:p="http://schemas.openxmlformats.org/presentationml/2006/main">
+  <p:cSld>
+    <p:spTree>
+      <p:nvGrpSpPr>
+        <p:cNvPr id="1" name=""/>
+        <p:cNvGrpSpPr/>
+        <p:nvPr/>
+      </p:nvGrpSpPr>
+      <p:grpSpPr>
+        <a:xfrm>
+          <a:off x="0" y="0"/>
+          <a:ext cx="0" cy="0"/>
+          <a:chOff x="0" y="0"/>
+          <a:chExt cx="0" cy="0"/>
+        </a:xfrm>
+      </p:grpSpPr>
+      <p:sp>
+        <p:nvSpPr>
+          <p:cNvPr id="2" name="Título 1">
+            <a:extLst>
+              <a:ext uri="{FF2B5EF4-FFF2-40B4-BE49-F238E27FC236}">
+                <a16:creationId xmlns:a16="http://schemas.microsoft.com/office/drawing/2014/main" id="{D9A6855F-FDF1-664B-968B-1F926243B131}"/>
+              </a:ext>
+            </a:extLst>
+          </p:cNvPr>
+          <p:cNvSpPr>
+            <a:spLocks noGrp="1"/>
+          </p:cNvSpPr>
+          <p:nvPr>
+            <p:ph type="title"/>
+          </p:nvPr>
+        </p:nvSpPr>
+        <p:spPr/>
+        <p:txBody>
+          <a:bodyPr/>
+          <a:lstStyle/>
+          <a:p>
+            <a:r>
+              <a:rPr lang="es-US" dirty="0"/>
+              <a:t>patterns.yaml</a:t>
+            </a:r>
+          </a:p>
+        </p:txBody>
+      </p:sp>
+      <p:sp>
+        <p:nvSpPr>
+          <p:cNvPr id="3" name="CuadroTexto 2">
+            <a:extLst>
+              <a:ext uri="{FF2B5EF4-FFF2-40B4-BE49-F238E27FC236}">
+                <a16:creationId xmlns:a16="http://schemas.microsoft.com/office/drawing/2014/main" id="{CCE4CE64-75F9-164A-94B0-980B72999868}"/>
+              </a:ext>
+            </a:extLst>
+          </p:cNvPr>
+          <p:cNvSpPr txBox="1"/>
+          <p:nvPr/>
+        </p:nvSpPr>
+        <p:spPr>
+          <a:xfrm>
+            <a:off x="931025" y="1690688"/>
+            <a:ext cx="10706793" cy="3693319"/>
+          </a:xfrm>
+          <a:prstGeom prst="rect">
+            <a:avLst/>
+          </a:prstGeom>
+          <a:noFill/>
+        </p:spPr>
+        <p:txBody>
+          <a:bodyPr wrap="square" rtlCol="0">
+            <a:spAutoFit/>
+          </a:bodyPr>
+          <a:lstStyle/>
+          <a:p>
+            <a:r>
+              <a:rPr lang="es-US" dirty="0"/>
+              <a:t>#</a:t>
+            </a:r>
+          </a:p>
+          <a:p>
+            <a:r>
+              <a:rPr lang="es-US" dirty="0"/>
+              <a:t># Patterns for flying a glider around a moving drifter</a:t>
+            </a:r>
+          </a:p>
+          <a:p>
+            <a:r>
+              <a:rPr lang="es-US" dirty="0"/>
+              <a:t>#</a:t>
+            </a:r>
+          </a:p>
+          <a:p>
+            <a:r>
+              <a:rPr lang="es-US" dirty="0"/>
+              <a:t>osu683:                         # Glider to work with</a:t>
+            </a:r>
+          </a:p>
+          <a:p>
+            <a:r>
+              <a:rPr lang="es-US" dirty="0"/>
+              <a:t>        IMEI: "300234068117290" # Which beacon to follow</a:t>
+            </a:r>
+          </a:p>
+          <a:p>
+            <a:r>
+              <a:rPr lang="es-US" dirty="0"/>
+              <a:t>        qRotate: False          # Rotate the pattern so the x/eastward is along drifter velocity</a:t>
+            </a:r>
+          </a:p>
+          <a:p>
+            <a:r>
+              <a:rPr lang="es-US" dirty="0"/>
+              <a:t>        norm: 707               # km to meters, 1000/root(2) so 1km on a side</a:t>
+            </a:r>
+          </a:p>
+          <a:p>
+            <a:r>
+              <a:rPr lang="es-US" dirty="0"/>
+              <a:t>        theta: 0                # rotate pattern by this many degrees northwards</a:t>
+            </a:r>
+          </a:p>
+          <a:p>
+            <a:r>
+              <a:rPr lang="es-US" dirty="0"/>
+              <a:t>        pattern:                # pattern in km with drifter at the center</a:t>
+            </a:r>
+          </a:p>
+          <a:p>
+            <a:r>
+              <a:rPr lang="es-US" dirty="0"/>
+              <a:t>        - [ 1, 0] # East, North</a:t>
+            </a:r>
+          </a:p>
+          <a:p>
+            <a:r>
+              <a:rPr lang="es-US" dirty="0"/>
+              <a:t>        - [-1, 0] # East, North</a:t>
+            </a:r>
+          </a:p>
+          <a:p>
+            <a:r>
+              <a:rPr lang="es-US" dirty="0"/>
+              <a:t>        - [ 0, 1] # East, North</a:t>
+            </a:r>
+          </a:p>
+          <a:p>
+            <a:r>
+              <a:rPr lang="es-US" dirty="0"/>
+              <a:t>        - [ 0,-1] # East, North</a:t>
+            </a:r>
+          </a:p>
+        </p:txBody>
+      </p:sp>
+    </p:spTree>
+    <p:extLst>
+      <p:ext uri="{BB962C8B-B14F-4D97-AF65-F5344CB8AC3E}">
+        <p14:creationId xmlns:p14="http://schemas.microsoft.com/office/powerpoint/2010/main" val="158237937"/>
+      </p:ext>
+    </p:extLst>
+  </p:cSld>
+  <p:clrMapOvr>
+    <a:masterClrMapping/>
+  </p:clrMapOvr>
+</p:sld>
+</file>
+
+<file path=ppt/slides/slide8.xml><?xml version="1.0" encoding="utf-8"?>
+<p:sld xmlns:a="http://schemas.openxmlformats.org/drawingml/2006/main" xmlns:r="http://schemas.openxmlformats.org/officeDocument/2006/relationships" xmlns:p="http://schemas.openxmlformats.org/presentationml/2006/main">
+  <p:cSld>
+    <p:spTree>
+      <p:nvGrpSpPr>
+        <p:cNvPr id="1" name=""/>
+        <p:cNvGrpSpPr/>
+        <p:nvPr/>
+      </p:nvGrpSpPr>
+      <p:grpSpPr>
+        <a:xfrm>
+          <a:off x="0" y="0"/>
+          <a:ext cx="0" cy="0"/>
+          <a:chOff x="0" y="0"/>
+          <a:chExt cx="0" cy="0"/>
+        </a:xfrm>
+      </p:grpSpPr>
+      <p:sp>
+        <p:nvSpPr>
+          <p:cNvPr id="3" name="CuadroTexto 2">
+            <a:extLst>
+              <a:ext uri="{FF2B5EF4-FFF2-40B4-BE49-F238E27FC236}">
+                <a16:creationId xmlns:a16="http://schemas.microsoft.com/office/drawing/2014/main" id="{236C0204-4D3E-E940-81EF-38E81B4BFF5F}"/>
+              </a:ext>
+            </a:extLst>
+          </p:cNvPr>
+          <p:cNvSpPr txBox="1"/>
+          <p:nvPr/>
+        </p:nvSpPr>
+        <p:spPr>
+          <a:xfrm>
+            <a:off x="241069" y="166255"/>
+            <a:ext cx="11829011" cy="6463308"/>
+          </a:xfrm>
+          <a:prstGeom prst="rect">
+            <a:avLst/>
+          </a:prstGeom>
+          <a:noFill/>
+        </p:spPr>
+        <p:txBody>
+          <a:bodyPr wrap="square" rtlCol="0">
+            <a:spAutoFit/>
+          </a:bodyPr>
+          <a:lstStyle/>
+          <a:p>
+            <a:pPr marL="285750" indent="-285750">
+              <a:buFont typeface="Arial" panose="020B0604020202020204" pitchFamily="34" charset="0"/>
+              <a:buChar char="•"/>
+            </a:pPr>
+            <a:r>
+              <a:rPr lang="es-US" dirty="0"/>
+              <a:t>One specifies the glider one wants to apply the pattern to, in this case osu683.</a:t>
+            </a:r>
+          </a:p>
+          <a:p>
+            <a:pPr marL="285750" indent="-285750">
+              <a:buFont typeface="Arial" panose="020B0604020202020204" pitchFamily="34" charset="0"/>
+              <a:buChar char="•"/>
+            </a:pPr>
+            <a:r>
+              <a:rPr lang="es-US" dirty="0"/>
+              <a:t>IMEI is the GPS beacon the glider will follow.</a:t>
+            </a:r>
+          </a:p>
+          <a:p>
+            <a:pPr marL="285750" indent="-285750">
+              <a:buFont typeface="Arial" panose="020B0604020202020204" pitchFamily="34" charset="0"/>
+              <a:buChar char="•"/>
+            </a:pPr>
+            <a:r>
+              <a:rPr lang="es-US" dirty="0"/>
+              <a:t>qRotate specifies if the pattern is rotated such that the x axis of the pattern is aligned with lines of latitude or along the drifter's velocity vector.</a:t>
+            </a:r>
+          </a:p>
+          <a:p>
+            <a:pPr marL="285750" indent="-285750">
+              <a:buFont typeface="Arial" panose="020B0604020202020204" pitchFamily="34" charset="0"/>
+              <a:buChar char="•"/>
+            </a:pPr>
+            <a:r>
+              <a:rPr lang="es-US" dirty="0"/>
+              <a:t>norm is an overall scaling factor. </a:t>
+            </a:r>
+          </a:p>
+          <a:p>
+            <a:pPr marL="285750" indent="-285750">
+              <a:buFont typeface="Arial" panose="020B0604020202020204" pitchFamily="34" charset="0"/>
+              <a:buChar char="•"/>
+            </a:pPr>
+            <a:r>
+              <a:rPr lang="es-US" dirty="0"/>
+              <a:t>theta allows a rotation of the pattern. (This is what you were asking about.)</a:t>
+            </a:r>
+          </a:p>
+          <a:p>
+            <a:pPr marL="285750" indent="-285750">
+              <a:buFont typeface="Arial" panose="020B0604020202020204" pitchFamily="34" charset="0"/>
+              <a:buChar char="•"/>
+            </a:pPr>
+            <a:r>
+              <a:rPr lang="es-US" dirty="0"/>
+              <a:t>pattern is a list of x,y coordinates of the pattern. </a:t>
+            </a:r>
+          </a:p>
+          <a:p>
+            <a:pPr marL="742950" lvl="1" indent="-285750">
+              <a:buFont typeface="Arial" panose="020B0604020202020204" pitchFamily="34" charset="0"/>
+              <a:buChar char="•"/>
+            </a:pPr>
+            <a:r>
+              <a:rPr lang="es-US" dirty="0"/>
+              <a:t>With qRotate False, +x will be eastwards and +y will be northwards. </a:t>
+            </a:r>
+          </a:p>
+          <a:p>
+            <a:pPr marL="742950" lvl="1" indent="-285750">
+              <a:buFont typeface="Arial" panose="020B0604020202020204" pitchFamily="34" charset="0"/>
+              <a:buChar char="•"/>
+            </a:pPr>
+            <a:r>
+              <a:rPr lang="es-US" dirty="0"/>
+              <a:t>The actual pattern used is scaled by norm and rotated by theta. </a:t>
+            </a:r>
+          </a:p>
+          <a:p>
+            <a:pPr marL="742950" lvl="1" indent="-285750">
+              <a:buFont typeface="Arial" panose="020B0604020202020204" pitchFamily="34" charset="0"/>
+              <a:buChar char="•"/>
+            </a:pPr>
+            <a:r>
+              <a:rPr lang="es-US" dirty="0"/>
+              <a:t>Then possibly rotated again if qRotate is True. </a:t>
+            </a:r>
+          </a:p>
+          <a:p>
+            <a:pPr marL="742950" lvl="1" indent="-285750">
+              <a:buFont typeface="Arial" panose="020B0604020202020204" pitchFamily="34" charset="0"/>
+              <a:buChar char="•"/>
+            </a:pPr>
+            <a:r>
+              <a:rPr lang="es-US" dirty="0"/>
+              <a:t>The actual pattern should end up in meters.  </a:t>
+            </a:r>
+          </a:p>
+          <a:p>
+            <a:pPr marL="742950" lvl="1" indent="-285750">
+              <a:buFont typeface="Arial" panose="020B0604020202020204" pitchFamily="34" charset="0"/>
+              <a:buChar char="•"/>
+            </a:pPr>
+            <a:r>
+              <a:rPr lang="es-US" dirty="0"/>
+              <a:t>The number of points in the pattern is only limited by your imagination, but less than ~50 is a reasonable number. </a:t>
+            </a:r>
+          </a:p>
+          <a:p>
+            <a:pPr marL="742950" lvl="1" indent="-285750">
+              <a:buFont typeface="Arial" panose="020B0604020202020204" pitchFamily="34" charset="0"/>
+              <a:buChar char="•"/>
+            </a:pPr>
+            <a:r>
+              <a:rPr lang="es-US" dirty="0"/>
+              <a:t>The algorithm to find the closest point to start with is linear in N.</a:t>
+            </a:r>
+          </a:p>
+          <a:p>
+            <a:endParaRPr lang="es-US" dirty="0"/>
+          </a:p>
+          <a:p>
+            <a:r>
+              <a:rPr lang="es-US" dirty="0"/>
+              <a:t>Currently the patterns.yaml file lives on gliderfmc0 in the /home/pat/GSatMicroListener directory. If the file is modified, then the software will automatically reload the file. Currently only Anatoli or I have access to gliderfmc0.</a:t>
+            </a:r>
+          </a:p>
+          <a:p>
+            <a:endParaRPr lang="es-US" dirty="0"/>
+          </a:p>
+          <a:p>
+            <a:r>
+              <a:rPr lang="es-US" dirty="0"/>
+              <a:t>Initially, after the pattern is loaded or reloaded, the first point the glider flies to will be the closest in time. After that, it flies through the pattern list sequentially.</a:t>
+            </a:r>
+          </a:p>
+          <a:p>
+            <a:endParaRPr lang="es-US"/>
+          </a:p>
+          <a:p>
+            <a:r>
+              <a:rPr lang="es-US"/>
+              <a:t>If </a:t>
+            </a:r>
+            <a:r>
+              <a:rPr lang="es-US" dirty="0"/>
+              <a:t>the pattern has not been reloaded, then the new goto will start with the pattern point that corresponds to the current waypoint in the previous generated goto file.</a:t>
+            </a:r>
+          </a:p>
+          <a:p>
+            <a:endParaRPr lang="es-US" dirty="0"/>
+          </a:p>
+        </p:txBody>
+      </p:sp>
+    </p:spTree>
+    <p:extLst>
+      <p:ext uri="{BB962C8B-B14F-4D97-AF65-F5344CB8AC3E}">
+        <p14:creationId xmlns:p14="http://schemas.microsoft.com/office/powerpoint/2010/main" val="373106663"/>
+      </p:ext>
+    </p:extLst>
+  </p:cSld>
+  <p:clrMapOvr>
+    <a:masterClrMapping/>
+  </p:clrMapOvr>
+</p:sld>
+</file>
+
 <file path=ppt/theme/theme1.xml><?xml version="1.0" encoding="utf-8"?>
 <a:theme xmlns:a="http://schemas.openxmlformats.org/drawingml/2006/main" name="Tema de Office">
   <a:themeElements>

</xml_diff>